<commit_message>
Got figure 4 ready
</commit_message>
<xml_diff>
--- a/results/figures/illustrator/fig_4.pptx
+++ b/results/figures/illustrator/fig_4.pptx
@@ -5,11 +5,13 @@
     <p:sldMasterId id="2147483648" r:id="rId1"/>
   </p:sldMasterIdLst>
   <p:notesMasterIdLst>
-    <p:notesMasterId r:id="rId4"/>
+    <p:notesMasterId r:id="rId6"/>
   </p:notesMasterIdLst>
   <p:sldIdLst>
     <p:sldId id="256" r:id="rId2"/>
     <p:sldId id="257" r:id="rId3"/>
+    <p:sldId id="258" r:id="rId4"/>
+    <p:sldId id="259" r:id="rId5"/>
   </p:sldIdLst>
   <p:sldSz cx="12192000" cy="6858000"/>
   <p:notesSz cx="6858000" cy="9144000"/>
@@ -108,6 +110,11 @@
       </a:defRPr>
     </a:lvl9pPr>
   </p:defaultTextStyle>
+  <p:extLst>
+    <p:ext uri="{EFAFB233-063F-42B5-8137-9DF3F51BA10A}">
+      <p15:sldGuideLst xmlns:p15="http://schemas.microsoft.com/office/powerpoint/2012/main"/>
+    </p:ext>
+  </p:extLst>
 </p:presentation>
 </file>
 
@@ -193,7 +200,7 @@
           <a:p>
             <a:fld id="{11665125-72F4-FE4C-8705-730361A35DC2}" type="datetimeFigureOut">
               <a:rPr lang="pt-BR" smtClean="0"/>
-              <a:t>14/11/2024</a:t>
+              <a:t>20/11/2024</a:t>
             </a:fld>
             <a:endParaRPr lang="pt-BR"/>
           </a:p>
@@ -802,7 +809,7 @@
           <a:p>
             <a:fld id="{5BB5007C-BB9C-694D-B2B3-C956473545E4}" type="datetimeFigureOut">
               <a:rPr lang="pt-BR" smtClean="0"/>
-              <a:t>14/11/2024</a:t>
+              <a:t>20/11/2024</a:t>
             </a:fld>
             <a:endParaRPr lang="pt-BR"/>
           </a:p>
@@ -1002,7 +1009,7 @@
           <a:p>
             <a:fld id="{5BB5007C-BB9C-694D-B2B3-C956473545E4}" type="datetimeFigureOut">
               <a:rPr lang="pt-BR" smtClean="0"/>
-              <a:t>14/11/2024</a:t>
+              <a:t>20/11/2024</a:t>
             </a:fld>
             <a:endParaRPr lang="pt-BR"/>
           </a:p>
@@ -1212,7 +1219,7 @@
           <a:p>
             <a:fld id="{5BB5007C-BB9C-694D-B2B3-C956473545E4}" type="datetimeFigureOut">
               <a:rPr lang="pt-BR" smtClean="0"/>
-              <a:t>14/11/2024</a:t>
+              <a:t>20/11/2024</a:t>
             </a:fld>
             <a:endParaRPr lang="pt-BR"/>
           </a:p>
@@ -1412,7 +1419,7 @@
           <a:p>
             <a:fld id="{5BB5007C-BB9C-694D-B2B3-C956473545E4}" type="datetimeFigureOut">
               <a:rPr lang="pt-BR" smtClean="0"/>
-              <a:t>14/11/2024</a:t>
+              <a:t>20/11/2024</a:t>
             </a:fld>
             <a:endParaRPr lang="pt-BR"/>
           </a:p>
@@ -1688,7 +1695,7 @@
           <a:p>
             <a:fld id="{5BB5007C-BB9C-694D-B2B3-C956473545E4}" type="datetimeFigureOut">
               <a:rPr lang="pt-BR" smtClean="0"/>
-              <a:t>14/11/2024</a:t>
+              <a:t>20/11/2024</a:t>
             </a:fld>
             <a:endParaRPr lang="pt-BR"/>
           </a:p>
@@ -1956,7 +1963,7 @@
           <a:p>
             <a:fld id="{5BB5007C-BB9C-694D-B2B3-C956473545E4}" type="datetimeFigureOut">
               <a:rPr lang="pt-BR" smtClean="0"/>
-              <a:t>14/11/2024</a:t>
+              <a:t>20/11/2024</a:t>
             </a:fld>
             <a:endParaRPr lang="pt-BR"/>
           </a:p>
@@ -2371,7 +2378,7 @@
           <a:p>
             <a:fld id="{5BB5007C-BB9C-694D-B2B3-C956473545E4}" type="datetimeFigureOut">
               <a:rPr lang="pt-BR" smtClean="0"/>
-              <a:t>14/11/2024</a:t>
+              <a:t>20/11/2024</a:t>
             </a:fld>
             <a:endParaRPr lang="pt-BR"/>
           </a:p>
@@ -2513,7 +2520,7 @@
           <a:p>
             <a:fld id="{5BB5007C-BB9C-694D-B2B3-C956473545E4}" type="datetimeFigureOut">
               <a:rPr lang="pt-BR" smtClean="0"/>
-              <a:t>14/11/2024</a:t>
+              <a:t>20/11/2024</a:t>
             </a:fld>
             <a:endParaRPr lang="pt-BR"/>
           </a:p>
@@ -2626,7 +2633,7 @@
           <a:p>
             <a:fld id="{5BB5007C-BB9C-694D-B2B3-C956473545E4}" type="datetimeFigureOut">
               <a:rPr lang="pt-BR" smtClean="0"/>
-              <a:t>14/11/2024</a:t>
+              <a:t>20/11/2024</a:t>
             </a:fld>
             <a:endParaRPr lang="pt-BR"/>
           </a:p>
@@ -2939,7 +2946,7 @@
           <a:p>
             <a:fld id="{5BB5007C-BB9C-694D-B2B3-C956473545E4}" type="datetimeFigureOut">
               <a:rPr lang="pt-BR" smtClean="0"/>
-              <a:t>14/11/2024</a:t>
+              <a:t>20/11/2024</a:t>
             </a:fld>
             <a:endParaRPr lang="pt-BR"/>
           </a:p>
@@ -3228,7 +3235,7 @@
           <a:p>
             <a:fld id="{5BB5007C-BB9C-694D-B2B3-C956473545E4}" type="datetimeFigureOut">
               <a:rPr lang="pt-BR" smtClean="0"/>
-              <a:t>14/11/2024</a:t>
+              <a:t>20/11/2024</a:t>
             </a:fld>
             <a:endParaRPr lang="pt-BR"/>
           </a:p>
@@ -3471,7 +3478,7 @@
           <a:p>
             <a:fld id="{5BB5007C-BB9C-694D-B2B3-C956473545E4}" type="datetimeFigureOut">
               <a:rPr lang="pt-BR" smtClean="0"/>
-              <a:t>14/11/2024</a:t>
+              <a:t>20/11/2024</a:t>
             </a:fld>
             <a:endParaRPr lang="pt-BR"/>
           </a:p>
@@ -3890,10 +3897,10 @@
       </p:grpSpPr>
       <p:pic>
         <p:nvPicPr>
-          <p:cNvPr id="65" name="Picture 64">
-            <a:extLst>
-              <a:ext uri="{FF2B5EF4-FFF2-40B4-BE49-F238E27FC236}">
-                <a16:creationId xmlns:a16="http://schemas.microsoft.com/office/drawing/2014/main" id="{5C8059ED-E644-6E5C-4C9A-397FBF370050}"/>
+          <p:cNvPr id="69" name="Picture 68">
+            <a:extLst>
+              <a:ext uri="{FF2B5EF4-FFF2-40B4-BE49-F238E27FC236}">
+                <a16:creationId xmlns:a16="http://schemas.microsoft.com/office/drawing/2014/main" id="{3BC005DE-B4B1-DA14-E410-6867D451ACB8}"/>
               </a:ext>
             </a:extLst>
           </p:cNvPr>
@@ -4560,6 +4567,440 @@
     <p:extLst>
       <p:ext uri="{BB962C8B-B14F-4D97-AF65-F5344CB8AC3E}">
         <p14:creationId xmlns:p14="http://schemas.microsoft.com/office/powerpoint/2010/main" val="2057544429"/>
+      </p:ext>
+    </p:extLst>
+  </p:cSld>
+  <p:clrMapOvr>
+    <a:masterClrMapping/>
+  </p:clrMapOvr>
+</p:sld>
+</file>
+
+<file path=ppt/slides/slide3.xml><?xml version="1.0" encoding="utf-8"?>
+<p:sld xmlns:a="http://schemas.openxmlformats.org/drawingml/2006/main" xmlns:r="http://schemas.openxmlformats.org/officeDocument/2006/relationships" xmlns:p="http://schemas.openxmlformats.org/presentationml/2006/main">
+  <p:cSld>
+    <p:spTree>
+      <p:nvGrpSpPr>
+        <p:cNvPr id="1" name=""/>
+        <p:cNvGrpSpPr/>
+        <p:nvPr/>
+      </p:nvGrpSpPr>
+      <p:grpSpPr>
+        <a:xfrm>
+          <a:off x="0" y="0"/>
+          <a:ext cx="0" cy="0"/>
+          <a:chOff x="0" y="0"/>
+          <a:chExt cx="0" cy="0"/>
+        </a:xfrm>
+      </p:grpSpPr>
+      <p:pic>
+        <p:nvPicPr>
+          <p:cNvPr id="55" name="Picture 54">
+            <a:extLst>
+              <a:ext uri="{FF2B5EF4-FFF2-40B4-BE49-F238E27FC236}">
+                <a16:creationId xmlns:a16="http://schemas.microsoft.com/office/drawing/2014/main" id="{B09F204B-A689-E9FC-400B-2473FD9EBE3F}"/>
+              </a:ext>
+            </a:extLst>
+          </p:cNvPr>
+          <p:cNvPicPr>
+            <a:picLocks noChangeAspect="1"/>
+          </p:cNvPicPr>
+          <p:nvPr/>
+        </p:nvPicPr>
+        <p:blipFill>
+          <a:blip r:embed="rId2"/>
+          <a:stretch>
+            <a:fillRect/>
+          </a:stretch>
+        </p:blipFill>
+        <p:spPr>
+          <a:xfrm>
+            <a:off x="3013329" y="0"/>
+            <a:ext cx="6000750" cy="6858000"/>
+          </a:xfrm>
+          <a:prstGeom prst="rect">
+            <a:avLst/>
+          </a:prstGeom>
+        </p:spPr>
+      </p:pic>
+      <p:sp>
+        <p:nvSpPr>
+          <p:cNvPr id="39" name="Left Brace 38">
+            <a:extLst>
+              <a:ext uri="{FF2B5EF4-FFF2-40B4-BE49-F238E27FC236}">
+                <a16:creationId xmlns:a16="http://schemas.microsoft.com/office/drawing/2014/main" id="{79089012-D8A7-7ECC-E222-4C81F586AE6D}"/>
+              </a:ext>
+            </a:extLst>
+          </p:cNvPr>
+          <p:cNvSpPr/>
+          <p:nvPr/>
+        </p:nvSpPr>
+        <p:spPr>
+          <a:xfrm rot="10800000">
+            <a:off x="6858301" y="4837319"/>
+            <a:ext cx="144000" cy="528430"/>
+          </a:xfrm>
+          <a:prstGeom prst="leftBrace">
+            <a:avLst/>
+          </a:prstGeom>
+        </p:spPr>
+        <p:style>
+          <a:lnRef idx="1">
+            <a:schemeClr val="dk1"/>
+          </a:lnRef>
+          <a:fillRef idx="0">
+            <a:schemeClr val="dk1"/>
+          </a:fillRef>
+          <a:effectRef idx="0">
+            <a:schemeClr val="dk1"/>
+          </a:effectRef>
+          <a:fontRef idx="minor">
+            <a:schemeClr val="tx1"/>
+          </a:fontRef>
+        </p:style>
+        <p:txBody>
+          <a:bodyPr rtlCol="0" anchor="ctr"/>
+          <a:lstStyle/>
+          <a:p>
+            <a:pPr algn="ctr"/>
+            <a:endParaRPr lang="pt-BR"/>
+          </a:p>
+        </p:txBody>
+      </p:sp>
+      <p:sp>
+        <p:nvSpPr>
+          <p:cNvPr id="32" name="Left Brace 31">
+            <a:extLst>
+              <a:ext uri="{FF2B5EF4-FFF2-40B4-BE49-F238E27FC236}">
+                <a16:creationId xmlns:a16="http://schemas.microsoft.com/office/drawing/2014/main" id="{E7E98DB4-AAA6-A966-104C-2A0994467C2C}"/>
+              </a:ext>
+            </a:extLst>
+          </p:cNvPr>
+          <p:cNvSpPr/>
+          <p:nvPr/>
+        </p:nvSpPr>
+        <p:spPr>
+          <a:xfrm rot="10800000">
+            <a:off x="6858301" y="5437570"/>
+            <a:ext cx="144000" cy="1020055"/>
+          </a:xfrm>
+          <a:prstGeom prst="leftBrace">
+            <a:avLst/>
+          </a:prstGeom>
+        </p:spPr>
+        <p:style>
+          <a:lnRef idx="1">
+            <a:schemeClr val="dk1"/>
+          </a:lnRef>
+          <a:fillRef idx="0">
+            <a:schemeClr val="dk1"/>
+          </a:fillRef>
+          <a:effectRef idx="0">
+            <a:schemeClr val="dk1"/>
+          </a:effectRef>
+          <a:fontRef idx="minor">
+            <a:schemeClr val="tx1"/>
+          </a:fontRef>
+        </p:style>
+        <p:txBody>
+          <a:bodyPr rtlCol="0" anchor="ctr"/>
+          <a:lstStyle/>
+          <a:p>
+            <a:pPr algn="ctr"/>
+            <a:endParaRPr lang="pt-BR"/>
+          </a:p>
+        </p:txBody>
+      </p:sp>
+      <p:sp>
+        <p:nvSpPr>
+          <p:cNvPr id="20" name="Left Brace 19">
+            <a:extLst>
+              <a:ext uri="{FF2B5EF4-FFF2-40B4-BE49-F238E27FC236}">
+                <a16:creationId xmlns:a16="http://schemas.microsoft.com/office/drawing/2014/main" id="{6D178A05-45D9-7BB9-2EE4-0558F51A0F54}"/>
+              </a:ext>
+            </a:extLst>
+          </p:cNvPr>
+          <p:cNvSpPr/>
+          <p:nvPr/>
+        </p:nvSpPr>
+        <p:spPr>
+          <a:xfrm rot="10800000">
+            <a:off x="6858301" y="4491094"/>
+            <a:ext cx="144000" cy="274404"/>
+          </a:xfrm>
+          <a:prstGeom prst="leftBrace">
+            <a:avLst/>
+          </a:prstGeom>
+        </p:spPr>
+        <p:style>
+          <a:lnRef idx="1">
+            <a:schemeClr val="dk1"/>
+          </a:lnRef>
+          <a:fillRef idx="0">
+            <a:schemeClr val="dk1"/>
+          </a:fillRef>
+          <a:effectRef idx="0">
+            <a:schemeClr val="dk1"/>
+          </a:effectRef>
+          <a:fontRef idx="minor">
+            <a:schemeClr val="tx1"/>
+          </a:fontRef>
+        </p:style>
+        <p:txBody>
+          <a:bodyPr rtlCol="0" anchor="ctr"/>
+          <a:lstStyle/>
+          <a:p>
+            <a:pPr algn="ctr"/>
+            <a:endParaRPr lang="pt-BR"/>
+          </a:p>
+        </p:txBody>
+      </p:sp>
+      <p:sp>
+        <p:nvSpPr>
+          <p:cNvPr id="21" name="Left Brace 20">
+            <a:extLst>
+              <a:ext uri="{FF2B5EF4-FFF2-40B4-BE49-F238E27FC236}">
+                <a16:creationId xmlns:a16="http://schemas.microsoft.com/office/drawing/2014/main" id="{2C9018D9-6EB3-5241-DC3E-1F9010B05607}"/>
+              </a:ext>
+            </a:extLst>
+          </p:cNvPr>
+          <p:cNvSpPr/>
+          <p:nvPr/>
+        </p:nvSpPr>
+        <p:spPr>
+          <a:xfrm rot="10800000">
+            <a:off x="6848775" y="3019424"/>
+            <a:ext cx="144000" cy="1399850"/>
+          </a:xfrm>
+          <a:prstGeom prst="leftBrace">
+            <a:avLst/>
+          </a:prstGeom>
+        </p:spPr>
+        <p:style>
+          <a:lnRef idx="1">
+            <a:schemeClr val="dk1"/>
+          </a:lnRef>
+          <a:fillRef idx="0">
+            <a:schemeClr val="dk1"/>
+          </a:fillRef>
+          <a:effectRef idx="0">
+            <a:schemeClr val="dk1"/>
+          </a:effectRef>
+          <a:fontRef idx="minor">
+            <a:schemeClr val="tx1"/>
+          </a:fontRef>
+        </p:style>
+        <p:txBody>
+          <a:bodyPr rtlCol="0" anchor="ctr"/>
+          <a:lstStyle/>
+          <a:p>
+            <a:pPr algn="ctr"/>
+            <a:endParaRPr lang="pt-BR"/>
+          </a:p>
+        </p:txBody>
+      </p:sp>
+      <p:sp>
+        <p:nvSpPr>
+          <p:cNvPr id="31" name="Left Brace 30">
+            <a:extLst>
+              <a:ext uri="{FF2B5EF4-FFF2-40B4-BE49-F238E27FC236}">
+                <a16:creationId xmlns:a16="http://schemas.microsoft.com/office/drawing/2014/main" id="{8D9B4805-8AC2-906D-9955-3763E296E84D}"/>
+              </a:ext>
+            </a:extLst>
+          </p:cNvPr>
+          <p:cNvSpPr/>
+          <p:nvPr/>
+        </p:nvSpPr>
+        <p:spPr>
+          <a:xfrm rot="10800000">
+            <a:off x="6858300" y="1825799"/>
+            <a:ext cx="144000" cy="902045"/>
+          </a:xfrm>
+          <a:prstGeom prst="leftBrace">
+            <a:avLst/>
+          </a:prstGeom>
+        </p:spPr>
+        <p:style>
+          <a:lnRef idx="1">
+            <a:schemeClr val="dk1"/>
+          </a:lnRef>
+          <a:fillRef idx="0">
+            <a:schemeClr val="dk1"/>
+          </a:fillRef>
+          <a:effectRef idx="0">
+            <a:schemeClr val="dk1"/>
+          </a:effectRef>
+          <a:fontRef idx="minor">
+            <a:schemeClr val="tx1"/>
+          </a:fontRef>
+        </p:style>
+        <p:txBody>
+          <a:bodyPr rtlCol="0" anchor="ctr"/>
+          <a:lstStyle/>
+          <a:p>
+            <a:pPr algn="ctr"/>
+            <a:endParaRPr lang="pt-BR"/>
+          </a:p>
+        </p:txBody>
+      </p:sp>
+      <p:sp>
+        <p:nvSpPr>
+          <p:cNvPr id="40" name="Left Brace 39">
+            <a:extLst>
+              <a:ext uri="{FF2B5EF4-FFF2-40B4-BE49-F238E27FC236}">
+                <a16:creationId xmlns:a16="http://schemas.microsoft.com/office/drawing/2014/main" id="{3232E638-982C-9743-7767-63FDDECF8DE6}"/>
+              </a:ext>
+            </a:extLst>
+          </p:cNvPr>
+          <p:cNvSpPr/>
+          <p:nvPr/>
+        </p:nvSpPr>
+        <p:spPr>
+          <a:xfrm rot="10800000">
+            <a:off x="6858300" y="1104899"/>
+            <a:ext cx="144000" cy="654050"/>
+          </a:xfrm>
+          <a:prstGeom prst="leftBrace">
+            <a:avLst/>
+          </a:prstGeom>
+        </p:spPr>
+        <p:style>
+          <a:lnRef idx="1">
+            <a:schemeClr val="dk1"/>
+          </a:lnRef>
+          <a:fillRef idx="0">
+            <a:schemeClr val="dk1"/>
+          </a:fillRef>
+          <a:effectRef idx="0">
+            <a:schemeClr val="dk1"/>
+          </a:effectRef>
+          <a:fontRef idx="minor">
+            <a:schemeClr val="tx1"/>
+          </a:fontRef>
+        </p:style>
+        <p:txBody>
+          <a:bodyPr rtlCol="0" anchor="ctr"/>
+          <a:lstStyle/>
+          <a:p>
+            <a:pPr algn="ctr"/>
+            <a:endParaRPr lang="pt-BR"/>
+          </a:p>
+        </p:txBody>
+      </p:sp>
+    </p:spTree>
+    <p:extLst>
+      <p:ext uri="{BB962C8B-B14F-4D97-AF65-F5344CB8AC3E}">
+        <p14:creationId xmlns:p14="http://schemas.microsoft.com/office/powerpoint/2010/main" val="155665852"/>
+      </p:ext>
+    </p:extLst>
+  </p:cSld>
+  <p:clrMapOvr>
+    <a:masterClrMapping/>
+  </p:clrMapOvr>
+</p:sld>
+</file>
+
+<file path=ppt/slides/slide4.xml><?xml version="1.0" encoding="utf-8"?>
+<p:sld xmlns:a="http://schemas.openxmlformats.org/drawingml/2006/main" xmlns:r="http://schemas.openxmlformats.org/officeDocument/2006/relationships" xmlns:p="http://schemas.openxmlformats.org/presentationml/2006/main">
+  <p:cSld>
+    <p:spTree>
+      <p:nvGrpSpPr>
+        <p:cNvPr id="1" name=""/>
+        <p:cNvGrpSpPr/>
+        <p:nvPr/>
+      </p:nvGrpSpPr>
+      <p:grpSpPr>
+        <a:xfrm>
+          <a:off x="0" y="0"/>
+          <a:ext cx="0" cy="0"/>
+          <a:chOff x="0" y="0"/>
+          <a:chExt cx="0" cy="0"/>
+        </a:xfrm>
+      </p:grpSpPr>
+      <p:sp>
+        <p:nvSpPr>
+          <p:cNvPr id="2" name="Title 1">
+            <a:extLst>
+              <a:ext uri="{FF2B5EF4-FFF2-40B4-BE49-F238E27FC236}">
+                <a16:creationId xmlns:a16="http://schemas.microsoft.com/office/drawing/2014/main" id="{2F049B30-66D3-0FEB-B83B-E4714D4CDD70}"/>
+              </a:ext>
+            </a:extLst>
+          </p:cNvPr>
+          <p:cNvSpPr>
+            <a:spLocks noGrp="1"/>
+          </p:cNvSpPr>
+          <p:nvPr>
+            <p:ph type="title"/>
+          </p:nvPr>
+        </p:nvSpPr>
+        <p:spPr/>
+        <p:txBody>
+          <a:bodyPr/>
+          <a:lstStyle/>
+          <a:p>
+            <a:endParaRPr lang="pt-BR"/>
+          </a:p>
+        </p:txBody>
+      </p:sp>
+      <p:sp>
+        <p:nvSpPr>
+          <p:cNvPr id="3" name="Content Placeholder 2">
+            <a:extLst>
+              <a:ext uri="{FF2B5EF4-FFF2-40B4-BE49-F238E27FC236}">
+                <a16:creationId xmlns:a16="http://schemas.microsoft.com/office/drawing/2014/main" id="{BDFE0775-E048-86CB-B679-179138BA7A9C}"/>
+              </a:ext>
+            </a:extLst>
+          </p:cNvPr>
+          <p:cNvSpPr>
+            <a:spLocks noGrp="1"/>
+          </p:cNvSpPr>
+          <p:nvPr>
+            <p:ph idx="1"/>
+          </p:nvPr>
+        </p:nvSpPr>
+        <p:spPr/>
+        <p:txBody>
+          <a:bodyPr/>
+          <a:lstStyle/>
+          <a:p>
+            <a:endParaRPr lang="pt-BR"/>
+          </a:p>
+        </p:txBody>
+      </p:sp>
+      <p:pic>
+        <p:nvPicPr>
+          <p:cNvPr id="4" name="Picture 3">
+            <a:extLst>
+              <a:ext uri="{FF2B5EF4-FFF2-40B4-BE49-F238E27FC236}">
+                <a16:creationId xmlns:a16="http://schemas.microsoft.com/office/drawing/2014/main" id="{37763ED0-A1C5-2FDE-D2CC-0DDA3D2025B8}"/>
+              </a:ext>
+            </a:extLst>
+          </p:cNvPr>
+          <p:cNvPicPr>
+            <a:picLocks noChangeAspect="1"/>
+          </p:cNvPicPr>
+          <p:nvPr/>
+        </p:nvPicPr>
+        <p:blipFill>
+          <a:blip r:embed="rId2"/>
+          <a:stretch>
+            <a:fillRect/>
+          </a:stretch>
+        </p:blipFill>
+        <p:spPr>
+          <a:xfrm>
+            <a:off x="3095625" y="-10160"/>
+            <a:ext cx="6000750" cy="6858000"/>
+          </a:xfrm>
+          <a:prstGeom prst="rect">
+            <a:avLst/>
+          </a:prstGeom>
+        </p:spPr>
+      </p:pic>
+    </p:spTree>
+    <p:extLst>
+      <p:ext uri="{BB962C8B-B14F-4D97-AF65-F5344CB8AC3E}">
+        <p14:creationId xmlns:p14="http://schemas.microsoft.com/office/powerpoint/2010/main" val="1267866485"/>
       </p:ext>
     </p:extLst>
   </p:cSld>

</xml_diff>

<commit_message>
included Fig 4 modifications
</commit_message>
<xml_diff>
--- a/results/figures/illustrator/fig_4.pptx
+++ b/results/figures/illustrator/fig_4.pptx
@@ -4917,62 +4917,12 @@
           <a:chExt cx="0" cy="0"/>
         </a:xfrm>
       </p:grpSpPr>
-      <p:sp>
-        <p:nvSpPr>
-          <p:cNvPr id="2" name="Title 1">
-            <a:extLst>
-              <a:ext uri="{FF2B5EF4-FFF2-40B4-BE49-F238E27FC236}">
-                <a16:creationId xmlns:a16="http://schemas.microsoft.com/office/drawing/2014/main" id="{2F049B30-66D3-0FEB-B83B-E4714D4CDD70}"/>
-              </a:ext>
-            </a:extLst>
-          </p:cNvPr>
-          <p:cNvSpPr>
-            <a:spLocks noGrp="1"/>
-          </p:cNvSpPr>
-          <p:nvPr>
-            <p:ph type="title"/>
-          </p:nvPr>
-        </p:nvSpPr>
-        <p:spPr/>
-        <p:txBody>
-          <a:bodyPr/>
-          <a:lstStyle/>
-          <a:p>
-            <a:endParaRPr lang="pt-BR"/>
-          </a:p>
-        </p:txBody>
-      </p:sp>
-      <p:sp>
-        <p:nvSpPr>
-          <p:cNvPr id="3" name="Content Placeholder 2">
-            <a:extLst>
-              <a:ext uri="{FF2B5EF4-FFF2-40B4-BE49-F238E27FC236}">
-                <a16:creationId xmlns:a16="http://schemas.microsoft.com/office/drawing/2014/main" id="{BDFE0775-E048-86CB-B679-179138BA7A9C}"/>
-              </a:ext>
-            </a:extLst>
-          </p:cNvPr>
-          <p:cNvSpPr>
-            <a:spLocks noGrp="1"/>
-          </p:cNvSpPr>
-          <p:nvPr>
-            <p:ph idx="1"/>
-          </p:nvPr>
-        </p:nvSpPr>
-        <p:spPr/>
-        <p:txBody>
-          <a:bodyPr/>
-          <a:lstStyle/>
-          <a:p>
-            <a:endParaRPr lang="pt-BR"/>
-          </a:p>
-        </p:txBody>
-      </p:sp>
       <p:pic>
         <p:nvPicPr>
-          <p:cNvPr id="4" name="Picture 3">
-            <a:extLst>
-              <a:ext uri="{FF2B5EF4-FFF2-40B4-BE49-F238E27FC236}">
-                <a16:creationId xmlns:a16="http://schemas.microsoft.com/office/drawing/2014/main" id="{37763ED0-A1C5-2FDE-D2CC-0DDA3D2025B8}"/>
+          <p:cNvPr id="6" name="Picture 5">
+            <a:extLst>
+              <a:ext uri="{FF2B5EF4-FFF2-40B4-BE49-F238E27FC236}">
+                <a16:creationId xmlns:a16="http://schemas.microsoft.com/office/drawing/2014/main" id="{5510ABF7-C985-A9FC-1F14-A3600650BECF}"/>
               </a:ext>
             </a:extLst>
           </p:cNvPr>
@@ -4989,7 +4939,7 @@
         </p:blipFill>
         <p:spPr>
           <a:xfrm>
-            <a:off x="3095625" y="-10160"/>
+            <a:off x="3095625" y="0"/>
             <a:ext cx="6000750" cy="6858000"/>
           </a:xfrm>
           <a:prstGeom prst="rect">
@@ -4997,6 +4947,358 @@
           </a:prstGeom>
         </p:spPr>
       </p:pic>
+      <p:sp>
+        <p:nvSpPr>
+          <p:cNvPr id="7" name="Left Brace 6">
+            <a:extLst>
+              <a:ext uri="{FF2B5EF4-FFF2-40B4-BE49-F238E27FC236}">
+                <a16:creationId xmlns:a16="http://schemas.microsoft.com/office/drawing/2014/main" id="{376A7B66-9645-5E21-77E5-98FBF6BA15E4}"/>
+              </a:ext>
+            </a:extLst>
+          </p:cNvPr>
+          <p:cNvSpPr/>
+          <p:nvPr/>
+        </p:nvSpPr>
+        <p:spPr>
+          <a:xfrm rot="10800000">
+            <a:off x="6944722" y="4822825"/>
+            <a:ext cx="144000" cy="582062"/>
+          </a:xfrm>
+          <a:prstGeom prst="leftBrace">
+            <a:avLst/>
+          </a:prstGeom>
+        </p:spPr>
+        <p:style>
+          <a:lnRef idx="1">
+            <a:schemeClr val="dk1"/>
+          </a:lnRef>
+          <a:fillRef idx="0">
+            <a:schemeClr val="dk1"/>
+          </a:fillRef>
+          <a:effectRef idx="0">
+            <a:schemeClr val="dk1"/>
+          </a:effectRef>
+          <a:fontRef idx="minor">
+            <a:schemeClr val="tx1"/>
+          </a:fontRef>
+        </p:style>
+        <p:txBody>
+          <a:bodyPr rtlCol="0" anchor="ctr"/>
+          <a:lstStyle/>
+          <a:p>
+            <a:pPr algn="ctr"/>
+            <a:endParaRPr lang="pt-BR"/>
+          </a:p>
+        </p:txBody>
+      </p:sp>
+      <p:sp>
+        <p:nvSpPr>
+          <p:cNvPr id="8" name="Left Brace 7">
+            <a:extLst>
+              <a:ext uri="{FF2B5EF4-FFF2-40B4-BE49-F238E27FC236}">
+                <a16:creationId xmlns:a16="http://schemas.microsoft.com/office/drawing/2014/main" id="{F7394358-4315-A6A8-1BC4-355B10B3A7A3}"/>
+              </a:ext>
+            </a:extLst>
+          </p:cNvPr>
+          <p:cNvSpPr/>
+          <p:nvPr/>
+        </p:nvSpPr>
+        <p:spPr>
+          <a:xfrm rot="10800000">
+            <a:off x="6944721" y="5470664"/>
+            <a:ext cx="144000" cy="997634"/>
+          </a:xfrm>
+          <a:prstGeom prst="leftBrace">
+            <a:avLst/>
+          </a:prstGeom>
+        </p:spPr>
+        <p:style>
+          <a:lnRef idx="1">
+            <a:schemeClr val="dk1"/>
+          </a:lnRef>
+          <a:fillRef idx="0">
+            <a:schemeClr val="dk1"/>
+          </a:fillRef>
+          <a:effectRef idx="0">
+            <a:schemeClr val="dk1"/>
+          </a:effectRef>
+          <a:fontRef idx="minor">
+            <a:schemeClr val="tx1"/>
+          </a:fontRef>
+        </p:style>
+        <p:txBody>
+          <a:bodyPr rtlCol="0" anchor="ctr"/>
+          <a:lstStyle/>
+          <a:p>
+            <a:pPr algn="ctr"/>
+            <a:endParaRPr lang="pt-BR"/>
+          </a:p>
+        </p:txBody>
+      </p:sp>
+      <p:sp>
+        <p:nvSpPr>
+          <p:cNvPr id="9" name="Left Brace 8">
+            <a:extLst>
+              <a:ext uri="{FF2B5EF4-FFF2-40B4-BE49-F238E27FC236}">
+                <a16:creationId xmlns:a16="http://schemas.microsoft.com/office/drawing/2014/main" id="{4E122D63-3C8D-AE48-0BA3-1340FE094B99}"/>
+              </a:ext>
+            </a:extLst>
+          </p:cNvPr>
+          <p:cNvSpPr/>
+          <p:nvPr/>
+        </p:nvSpPr>
+        <p:spPr>
+          <a:xfrm rot="10800000">
+            <a:off x="6944722" y="4537075"/>
+            <a:ext cx="144000" cy="216799"/>
+          </a:xfrm>
+          <a:prstGeom prst="leftBrace">
+            <a:avLst/>
+          </a:prstGeom>
+        </p:spPr>
+        <p:style>
+          <a:lnRef idx="1">
+            <a:schemeClr val="dk1"/>
+          </a:lnRef>
+          <a:fillRef idx="0">
+            <a:schemeClr val="dk1"/>
+          </a:fillRef>
+          <a:effectRef idx="0">
+            <a:schemeClr val="dk1"/>
+          </a:effectRef>
+          <a:fontRef idx="minor">
+            <a:schemeClr val="tx1"/>
+          </a:fontRef>
+        </p:style>
+        <p:txBody>
+          <a:bodyPr rtlCol="0" anchor="ctr"/>
+          <a:lstStyle/>
+          <a:p>
+            <a:pPr algn="ctr"/>
+            <a:endParaRPr lang="pt-BR"/>
+          </a:p>
+        </p:txBody>
+      </p:sp>
+      <p:sp>
+        <p:nvSpPr>
+          <p:cNvPr id="10" name="Left Brace 9">
+            <a:extLst>
+              <a:ext uri="{FF2B5EF4-FFF2-40B4-BE49-F238E27FC236}">
+                <a16:creationId xmlns:a16="http://schemas.microsoft.com/office/drawing/2014/main" id="{F4FB36AF-AF1C-F2D6-AF0A-932F1D335856}"/>
+              </a:ext>
+            </a:extLst>
+          </p:cNvPr>
+          <p:cNvSpPr/>
+          <p:nvPr/>
+        </p:nvSpPr>
+        <p:spPr>
+          <a:xfrm rot="10800000">
+            <a:off x="6944722" y="3279774"/>
+            <a:ext cx="144000" cy="1188273"/>
+          </a:xfrm>
+          <a:prstGeom prst="leftBrace">
+            <a:avLst/>
+          </a:prstGeom>
+        </p:spPr>
+        <p:style>
+          <a:lnRef idx="1">
+            <a:schemeClr val="dk1"/>
+          </a:lnRef>
+          <a:fillRef idx="0">
+            <a:schemeClr val="dk1"/>
+          </a:fillRef>
+          <a:effectRef idx="0">
+            <a:schemeClr val="dk1"/>
+          </a:effectRef>
+          <a:fontRef idx="minor">
+            <a:schemeClr val="tx1"/>
+          </a:fontRef>
+        </p:style>
+        <p:txBody>
+          <a:bodyPr rtlCol="0" anchor="ctr"/>
+          <a:lstStyle/>
+          <a:p>
+            <a:pPr algn="ctr"/>
+            <a:endParaRPr lang="pt-BR"/>
+          </a:p>
+        </p:txBody>
+      </p:sp>
+      <p:sp>
+        <p:nvSpPr>
+          <p:cNvPr id="11" name="Left Brace 10">
+            <a:extLst>
+              <a:ext uri="{FF2B5EF4-FFF2-40B4-BE49-F238E27FC236}">
+                <a16:creationId xmlns:a16="http://schemas.microsoft.com/office/drawing/2014/main" id="{34D09DFA-30E0-1C0B-19B7-BE98E9C35679}"/>
+              </a:ext>
+            </a:extLst>
+          </p:cNvPr>
+          <p:cNvSpPr/>
+          <p:nvPr/>
+        </p:nvSpPr>
+        <p:spPr>
+          <a:xfrm rot="10800000">
+            <a:off x="6944721" y="1952622"/>
+            <a:ext cx="144000" cy="993777"/>
+          </a:xfrm>
+          <a:prstGeom prst="leftBrace">
+            <a:avLst/>
+          </a:prstGeom>
+        </p:spPr>
+        <p:style>
+          <a:lnRef idx="1">
+            <a:schemeClr val="dk1"/>
+          </a:lnRef>
+          <a:fillRef idx="0">
+            <a:schemeClr val="dk1"/>
+          </a:fillRef>
+          <a:effectRef idx="0">
+            <a:schemeClr val="dk1"/>
+          </a:effectRef>
+          <a:fontRef idx="minor">
+            <a:schemeClr val="tx1"/>
+          </a:fontRef>
+        </p:style>
+        <p:txBody>
+          <a:bodyPr rtlCol="0" anchor="ctr"/>
+          <a:lstStyle/>
+          <a:p>
+            <a:pPr algn="ctr"/>
+            <a:endParaRPr lang="pt-BR"/>
+          </a:p>
+        </p:txBody>
+      </p:sp>
+      <p:sp>
+        <p:nvSpPr>
+          <p:cNvPr id="12" name="Left Brace 11">
+            <a:extLst>
+              <a:ext uri="{FF2B5EF4-FFF2-40B4-BE49-F238E27FC236}">
+                <a16:creationId xmlns:a16="http://schemas.microsoft.com/office/drawing/2014/main" id="{C913AEFA-248F-7D43-7393-DD15DD3260FB}"/>
+              </a:ext>
+            </a:extLst>
+          </p:cNvPr>
+          <p:cNvSpPr/>
+          <p:nvPr/>
+        </p:nvSpPr>
+        <p:spPr>
+          <a:xfrm rot="10800000">
+            <a:off x="6944721" y="1092199"/>
+            <a:ext cx="144000" cy="791394"/>
+          </a:xfrm>
+          <a:prstGeom prst="leftBrace">
+            <a:avLst/>
+          </a:prstGeom>
+        </p:spPr>
+        <p:style>
+          <a:lnRef idx="1">
+            <a:schemeClr val="dk1"/>
+          </a:lnRef>
+          <a:fillRef idx="0">
+            <a:schemeClr val="dk1"/>
+          </a:fillRef>
+          <a:effectRef idx="0">
+            <a:schemeClr val="dk1"/>
+          </a:effectRef>
+          <a:fontRef idx="minor">
+            <a:schemeClr val="tx1"/>
+          </a:fontRef>
+        </p:style>
+        <p:txBody>
+          <a:bodyPr rtlCol="0" anchor="ctr"/>
+          <a:lstStyle/>
+          <a:p>
+            <a:pPr algn="ctr"/>
+            <a:endParaRPr lang="pt-BR"/>
+          </a:p>
+        </p:txBody>
+      </p:sp>
+      <p:sp>
+        <p:nvSpPr>
+          <p:cNvPr id="13" name="Left Brace 12">
+            <a:extLst>
+              <a:ext uri="{FF2B5EF4-FFF2-40B4-BE49-F238E27FC236}">
+                <a16:creationId xmlns:a16="http://schemas.microsoft.com/office/drawing/2014/main" id="{F95C8203-3FCB-B7F7-CE70-4AC88FFAF985}"/>
+              </a:ext>
+            </a:extLst>
+          </p:cNvPr>
+          <p:cNvSpPr/>
+          <p:nvPr/>
+        </p:nvSpPr>
+        <p:spPr>
+          <a:xfrm rot="10800000">
+            <a:off x="6944721" y="3012176"/>
+            <a:ext cx="144000" cy="208094"/>
+          </a:xfrm>
+          <a:prstGeom prst="leftBrace">
+            <a:avLst/>
+          </a:prstGeom>
+        </p:spPr>
+        <p:style>
+          <a:lnRef idx="1">
+            <a:schemeClr val="dk1"/>
+          </a:lnRef>
+          <a:fillRef idx="0">
+            <a:schemeClr val="dk1"/>
+          </a:fillRef>
+          <a:effectRef idx="0">
+            <a:schemeClr val="dk1"/>
+          </a:effectRef>
+          <a:fontRef idx="minor">
+            <a:schemeClr val="tx1"/>
+          </a:fontRef>
+        </p:style>
+        <p:txBody>
+          <a:bodyPr rtlCol="0" anchor="ctr"/>
+          <a:lstStyle/>
+          <a:p>
+            <a:pPr algn="ctr"/>
+            <a:endParaRPr lang="pt-BR"/>
+          </a:p>
+        </p:txBody>
+      </p:sp>
+      <p:sp>
+        <p:nvSpPr>
+          <p:cNvPr id="14" name="Left Brace 13">
+            <a:extLst>
+              <a:ext uri="{FF2B5EF4-FFF2-40B4-BE49-F238E27FC236}">
+                <a16:creationId xmlns:a16="http://schemas.microsoft.com/office/drawing/2014/main" id="{448B1503-818C-7C9D-A843-3196C26A2384}"/>
+              </a:ext>
+            </a:extLst>
+          </p:cNvPr>
+          <p:cNvSpPr/>
+          <p:nvPr/>
+        </p:nvSpPr>
+        <p:spPr>
+          <a:xfrm rot="10800000">
+            <a:off x="6944721" y="453740"/>
+            <a:ext cx="144000" cy="208094"/>
+          </a:xfrm>
+          <a:prstGeom prst="leftBrace">
+            <a:avLst/>
+          </a:prstGeom>
+        </p:spPr>
+        <p:style>
+          <a:lnRef idx="1">
+            <a:schemeClr val="dk1"/>
+          </a:lnRef>
+          <a:fillRef idx="0">
+            <a:schemeClr val="dk1"/>
+          </a:fillRef>
+          <a:effectRef idx="0">
+            <a:schemeClr val="dk1"/>
+          </a:effectRef>
+          <a:fontRef idx="minor">
+            <a:schemeClr val="tx1"/>
+          </a:fontRef>
+        </p:style>
+        <p:txBody>
+          <a:bodyPr rtlCol="0" anchor="ctr"/>
+          <a:lstStyle/>
+          <a:p>
+            <a:pPr algn="ctr"/>
+            <a:endParaRPr lang="pt-BR"/>
+          </a:p>
+        </p:txBody>
+      </p:sp>
     </p:spTree>
     <p:extLst>
       <p:ext uri="{BB962C8B-B14F-4D97-AF65-F5344CB8AC3E}">

</xml_diff>